<commit_message>
Merging in Caleb's changes to Final Presentation
</commit_message>
<xml_diff>
--- a/docs/AMDeSS_FinalPresentation.pptx
+++ b/docs/AMDeSS_FinalPresentation.pptx
@@ -5,23 +5,21 @@
     <p:sldMasterId id="2147483648" r:id="rId1"/>
   </p:sldMasterIdLst>
   <p:notesMasterIdLst>
-    <p:notesMasterId r:id="rId16"/>
+    <p:notesMasterId r:id="rId14"/>
   </p:notesMasterIdLst>
   <p:sldIdLst>
     <p:sldId id="256" r:id="rId2"/>
-    <p:sldId id="263" r:id="rId3"/>
-    <p:sldId id="281" r:id="rId4"/>
-    <p:sldId id="272" r:id="rId5"/>
-    <p:sldId id="282" r:id="rId6"/>
-    <p:sldId id="273" r:id="rId7"/>
-    <p:sldId id="283" r:id="rId8"/>
-    <p:sldId id="284" r:id="rId9"/>
-    <p:sldId id="274" r:id="rId10"/>
-    <p:sldId id="275" r:id="rId11"/>
-    <p:sldId id="276" r:id="rId12"/>
-    <p:sldId id="277" r:id="rId13"/>
-    <p:sldId id="269" r:id="rId14"/>
-    <p:sldId id="271" r:id="rId15"/>
+    <p:sldId id="281" r:id="rId3"/>
+    <p:sldId id="282" r:id="rId4"/>
+    <p:sldId id="273" r:id="rId5"/>
+    <p:sldId id="283" r:id="rId6"/>
+    <p:sldId id="284" r:id="rId7"/>
+    <p:sldId id="285" r:id="rId8"/>
+    <p:sldId id="286" r:id="rId9"/>
+    <p:sldId id="287" r:id="rId10"/>
+    <p:sldId id="288" r:id="rId11"/>
+    <p:sldId id="269" r:id="rId12"/>
+    <p:sldId id="271" r:id="rId13"/>
   </p:sldIdLst>
   <p:sldSz cx="12192000" cy="6858000"/>
   <p:notesSz cx="6858000" cy="9144000"/>
@@ -3934,7 +3932,7 @@
           <a:p>
             <a:r>
               <a:rPr lang="en-US" dirty="0" smtClean="0"/>
-              <a:t>Issues</a:t>
+              <a:t>Project Test Plan</a:t>
             </a:r>
             <a:endParaRPr lang="en-US" dirty="0"/>
           </a:p>
@@ -3942,40 +3940,81 @@
       </p:sp>
       <p:sp>
         <p:nvSpPr>
-          <p:cNvPr id="3" name="Text Placeholder 2"/>
-          <p:cNvSpPr>
-            <a:spLocks noGrp="1"/>
-          </p:cNvSpPr>
-          <p:nvPr>
-            <p:ph type="body" idx="1"/>
+          <p:cNvPr id="3" name="Content Placeholder 2"/>
+          <p:cNvSpPr>
+            <a:spLocks noGrp="1"/>
+          </p:cNvSpPr>
+          <p:nvPr>
+            <p:ph idx="1"/>
           </p:nvPr>
         </p:nvSpPr>
         <p:spPr/>
         <p:txBody>
-          <a:bodyPr/>
-          <a:lstStyle/>
-          <a:p>
-            <a:endParaRPr lang="en-US"/>
+          <a:bodyPr>
+            <a:normAutofit lnSpcReduction="10000"/>
+          </a:bodyPr>
+          <a:lstStyle/>
+          <a:p>
+            <a:r>
+              <a:rPr lang="en-US" dirty="0" smtClean="0"/>
+              <a:t>Verify the app can pair with the device when the device is powered</a:t>
+            </a:r>
+          </a:p>
+          <a:p>
+            <a:r>
+              <a:rPr lang="en-US" dirty="0" smtClean="0"/>
+              <a:t>Verify the device is shown to be initially disarmed in app</a:t>
+            </a:r>
+          </a:p>
+          <a:p>
+            <a:r>
+              <a:rPr lang="en-US" dirty="0" smtClean="0"/>
+              <a:t>Verify the device does not trigger an alarm when in disarm state</a:t>
+            </a:r>
+          </a:p>
+          <a:p>
+            <a:r>
+              <a:rPr lang="en-US" dirty="0" smtClean="0"/>
+              <a:t>Verify the device can be armed from app</a:t>
+            </a:r>
+          </a:p>
+          <a:p>
+            <a:r>
+              <a:rPr lang="en-US" dirty="0" smtClean="0"/>
+              <a:t>Verify the device triggers an alarm when in armed state</a:t>
+            </a:r>
+          </a:p>
+          <a:p>
+            <a:r>
+              <a:rPr lang="en-US" dirty="0" smtClean="0"/>
+              <a:t>Verify the alarm is triggered when the water bottle is grasped with the whole hand</a:t>
+            </a:r>
+          </a:p>
+          <a:p>
+            <a:r>
+              <a:rPr lang="en-US" dirty="0" smtClean="0"/>
+              <a:t>Verify the app alerts the user when the alarm is triggered</a:t>
+            </a:r>
+          </a:p>
+          <a:p>
+            <a:r>
+              <a:rPr lang="en-US" dirty="0" smtClean="0"/>
+              <a:t>Verify the app can disarm the device when it is in the alarm state</a:t>
+            </a:r>
+            <a:endParaRPr lang="en-US" dirty="0"/>
           </a:p>
         </p:txBody>
       </p:sp>
     </p:spTree>
     <p:extLst>
       <p:ext uri="{BB962C8B-B14F-4D97-AF65-F5344CB8AC3E}">
-        <p14:creationId xmlns:p14="http://schemas.microsoft.com/office/powerpoint/2010/main" val="4274845844"/>
+        <p14:creationId xmlns:p14="http://schemas.microsoft.com/office/powerpoint/2010/main" val="117820973"/>
       </p:ext>
     </p:extLst>
   </p:cSld>
   <p:clrMapOvr>
     <a:masterClrMapping/>
   </p:clrMapOvr>
-  <p:timing>
-    <p:tnLst>
-      <p:par>
-        <p:cTn xmlns:p14="http://schemas.microsoft.com/office/powerpoint/2010/main" id="1" dur="indefinite" restart="never" nodeType="tmRoot"/>
-      </p:par>
-    </p:tnLst>
-  </p:timing>
 </p:sld>
 </file>
 
@@ -4008,164 +4047,6 @@
         </p:nvSpPr>
         <p:spPr/>
         <p:txBody>
-          <a:bodyPr/>
-          <a:lstStyle/>
-          <a:p>
-            <a:r>
-              <a:rPr lang="en-US" dirty="0" smtClean="0"/>
-              <a:t>Modified Project</a:t>
-            </a:r>
-            <a:endParaRPr lang="en-US" dirty="0"/>
-          </a:p>
-        </p:txBody>
-      </p:sp>
-      <p:sp>
-        <p:nvSpPr>
-          <p:cNvPr id="3" name="Text Placeholder 2"/>
-          <p:cNvSpPr>
-            <a:spLocks noGrp="1"/>
-          </p:cNvSpPr>
-          <p:nvPr>
-            <p:ph type="body" idx="1"/>
-          </p:nvPr>
-        </p:nvSpPr>
-        <p:spPr/>
-        <p:txBody>
-          <a:bodyPr/>
-          <a:lstStyle/>
-          <a:p>
-            <a:endParaRPr lang="en-US"/>
-          </a:p>
-        </p:txBody>
-      </p:sp>
-    </p:spTree>
-    <p:extLst>
-      <p:ext uri="{BB962C8B-B14F-4D97-AF65-F5344CB8AC3E}">
-        <p14:creationId xmlns:p14="http://schemas.microsoft.com/office/powerpoint/2010/main" val="3434044172"/>
-      </p:ext>
-    </p:extLst>
-  </p:cSld>
-  <p:clrMapOvr>
-    <a:masterClrMapping/>
-  </p:clrMapOvr>
-  <p:timing>
-    <p:tnLst>
-      <p:par>
-        <p:cTn xmlns:p14="http://schemas.microsoft.com/office/powerpoint/2010/main" id="1" dur="indefinite" restart="never" nodeType="tmRoot"/>
-      </p:par>
-    </p:tnLst>
-  </p:timing>
-</p:sld>
-</file>
-
-<file path=ppt/slides/slide12.xml><?xml version="1.0" encoding="utf-8"?>
-<p:sld xmlns:a="http://schemas.openxmlformats.org/drawingml/2006/main" xmlns:r="http://schemas.openxmlformats.org/officeDocument/2006/relationships" xmlns:p="http://schemas.openxmlformats.org/presentationml/2006/main">
-  <p:cSld>
-    <p:spTree>
-      <p:nvGrpSpPr>
-        <p:cNvPr id="1" name=""/>
-        <p:cNvGrpSpPr/>
-        <p:nvPr/>
-      </p:nvGrpSpPr>
-      <p:grpSpPr>
-        <a:xfrm>
-          <a:off x="0" y="0"/>
-          <a:ext cx="0" cy="0"/>
-          <a:chOff x="0" y="0"/>
-          <a:chExt cx="0" cy="0"/>
-        </a:xfrm>
-      </p:grpSpPr>
-      <p:sp>
-        <p:nvSpPr>
-          <p:cNvPr id="2" name="Title 1"/>
-          <p:cNvSpPr>
-            <a:spLocks noGrp="1"/>
-          </p:cNvSpPr>
-          <p:nvPr>
-            <p:ph type="title"/>
-          </p:nvPr>
-        </p:nvSpPr>
-        <p:spPr/>
-        <p:txBody>
-          <a:bodyPr/>
-          <a:lstStyle/>
-          <a:p>
-            <a:r>
-              <a:rPr lang="en-US" dirty="0" smtClean="0"/>
-              <a:t>Testing</a:t>
-            </a:r>
-            <a:endParaRPr lang="en-US" dirty="0"/>
-          </a:p>
-        </p:txBody>
-      </p:sp>
-      <p:sp>
-        <p:nvSpPr>
-          <p:cNvPr id="3" name="Text Placeholder 2"/>
-          <p:cNvSpPr>
-            <a:spLocks noGrp="1"/>
-          </p:cNvSpPr>
-          <p:nvPr>
-            <p:ph type="body" idx="1"/>
-          </p:nvPr>
-        </p:nvSpPr>
-        <p:spPr/>
-        <p:txBody>
-          <a:bodyPr/>
-          <a:lstStyle/>
-          <a:p>
-            <a:endParaRPr lang="en-US"/>
-          </a:p>
-        </p:txBody>
-      </p:sp>
-    </p:spTree>
-    <p:extLst>
-      <p:ext uri="{BB962C8B-B14F-4D97-AF65-F5344CB8AC3E}">
-        <p14:creationId xmlns:p14="http://schemas.microsoft.com/office/powerpoint/2010/main" val="155835092"/>
-      </p:ext>
-    </p:extLst>
-  </p:cSld>
-  <p:clrMapOvr>
-    <a:masterClrMapping/>
-  </p:clrMapOvr>
-  <p:timing>
-    <p:tnLst>
-      <p:par>
-        <p:cTn xmlns:p14="http://schemas.microsoft.com/office/powerpoint/2010/main" id="1" dur="indefinite" restart="never" nodeType="tmRoot"/>
-      </p:par>
-    </p:tnLst>
-  </p:timing>
-</p:sld>
-</file>
-
-<file path=ppt/slides/slide13.xml><?xml version="1.0" encoding="utf-8"?>
-<p:sld xmlns:a="http://schemas.openxmlformats.org/drawingml/2006/main" xmlns:r="http://schemas.openxmlformats.org/officeDocument/2006/relationships" xmlns:p="http://schemas.openxmlformats.org/presentationml/2006/main">
-  <p:cSld>
-    <p:spTree>
-      <p:nvGrpSpPr>
-        <p:cNvPr id="1" name=""/>
-        <p:cNvGrpSpPr/>
-        <p:nvPr/>
-      </p:nvGrpSpPr>
-      <p:grpSpPr>
-        <a:xfrm>
-          <a:off x="0" y="0"/>
-          <a:ext cx="0" cy="0"/>
-          <a:chOff x="0" y="0"/>
-          <a:chExt cx="0" cy="0"/>
-        </a:xfrm>
-      </p:grpSpPr>
-      <p:sp>
-        <p:nvSpPr>
-          <p:cNvPr id="2" name="Title 1"/>
-          <p:cNvSpPr>
-            <a:spLocks noGrp="1"/>
-          </p:cNvSpPr>
-          <p:nvPr>
-            <p:ph type="title"/>
-          </p:nvPr>
-        </p:nvSpPr>
-        <p:spPr/>
-        <p:txBody>
           <a:bodyPr>
             <a:normAutofit/>
           </a:bodyPr>
@@ -4218,7 +4099,7 @@
 </p:sld>
 </file>
 
-<file path=ppt/slides/slide14.xml><?xml version="1.0" encoding="utf-8"?>
+<file path=ppt/slides/slide12.xml><?xml version="1.0" encoding="utf-8"?>
 <p:sld xmlns:a="http://schemas.openxmlformats.org/drawingml/2006/main" xmlns:r="http://schemas.openxmlformats.org/officeDocument/2006/relationships" xmlns:p="http://schemas.openxmlformats.org/presentationml/2006/main">
   <p:cSld>
     <p:spTree>
@@ -4333,85 +4214,6 @@
           <a:p>
             <a:r>
               <a:rPr lang="en-US" dirty="0" smtClean="0"/>
-              <a:t>Original Problem</a:t>
-            </a:r>
-            <a:endParaRPr lang="en-US" dirty="0"/>
-          </a:p>
-        </p:txBody>
-      </p:sp>
-      <p:sp>
-        <p:nvSpPr>
-          <p:cNvPr id="3" name="Text Placeholder 2"/>
-          <p:cNvSpPr>
-            <a:spLocks noGrp="1"/>
-          </p:cNvSpPr>
-          <p:nvPr>
-            <p:ph type="body" idx="1"/>
-          </p:nvPr>
-        </p:nvSpPr>
-        <p:spPr/>
-        <p:txBody>
-          <a:bodyPr/>
-          <a:lstStyle/>
-          <a:p>
-            <a:endParaRPr lang="en-US"/>
-          </a:p>
-        </p:txBody>
-      </p:sp>
-    </p:spTree>
-    <p:extLst>
-      <p:ext uri="{BB962C8B-B14F-4D97-AF65-F5344CB8AC3E}">
-        <p14:creationId xmlns:p14="http://schemas.microsoft.com/office/powerpoint/2010/main" val="1172724699"/>
-      </p:ext>
-    </p:extLst>
-  </p:cSld>
-  <p:clrMapOvr>
-    <a:masterClrMapping/>
-  </p:clrMapOvr>
-  <p:timing>
-    <p:tnLst>
-      <p:par>
-        <p:cTn xmlns:p14="http://schemas.microsoft.com/office/powerpoint/2010/main" id="1" dur="indefinite" restart="never" nodeType="tmRoot"/>
-      </p:par>
-    </p:tnLst>
-  </p:timing>
-</p:sld>
-</file>
-
-<file path=ppt/slides/slide3.xml><?xml version="1.0" encoding="utf-8"?>
-<p:sld xmlns:a="http://schemas.openxmlformats.org/drawingml/2006/main" xmlns:r="http://schemas.openxmlformats.org/officeDocument/2006/relationships" xmlns:p="http://schemas.openxmlformats.org/presentationml/2006/main">
-  <p:cSld>
-    <p:spTree>
-      <p:nvGrpSpPr>
-        <p:cNvPr id="1" name=""/>
-        <p:cNvGrpSpPr/>
-        <p:nvPr/>
-      </p:nvGrpSpPr>
-      <p:grpSpPr>
-        <a:xfrm>
-          <a:off x="0" y="0"/>
-          <a:ext cx="0" cy="0"/>
-          <a:chOff x="0" y="0"/>
-          <a:chExt cx="0" cy="0"/>
-        </a:xfrm>
-      </p:grpSpPr>
-      <p:sp>
-        <p:nvSpPr>
-          <p:cNvPr id="2" name="Title 1"/>
-          <p:cNvSpPr>
-            <a:spLocks noGrp="1"/>
-          </p:cNvSpPr>
-          <p:nvPr>
-            <p:ph type="title"/>
-          </p:nvPr>
-        </p:nvSpPr>
-        <p:spPr/>
-        <p:txBody>
-          <a:bodyPr/>
-          <a:lstStyle/>
-          <a:p>
-            <a:r>
-              <a:rPr lang="en-US" dirty="0" smtClean="0"/>
               <a:t>Problem</a:t>
             </a:r>
             <a:endParaRPr lang="en-US" dirty="0"/>
@@ -4517,7 +4319,7 @@
 </p:sld>
 </file>
 
-<file path=ppt/slides/slide4.xml><?xml version="1.0" encoding="utf-8"?>
+<file path=ppt/slides/slide3.xml><?xml version="1.0" encoding="utf-8"?>
 <p:sld xmlns:a="http://schemas.openxmlformats.org/drawingml/2006/main" xmlns:r="http://schemas.openxmlformats.org/officeDocument/2006/relationships" xmlns:p="http://schemas.openxmlformats.org/presentationml/2006/main">
   <p:cSld>
     <p:spTree>
@@ -4552,89 +4354,6 @@
             <a:r>
               <a:rPr lang="en-US" dirty="0" smtClean="0"/>
               <a:t>Solution</a:t>
-            </a:r>
-            <a:endParaRPr lang="en-US" dirty="0"/>
-          </a:p>
-        </p:txBody>
-      </p:sp>
-      <p:sp>
-        <p:nvSpPr>
-          <p:cNvPr id="3" name="Text Placeholder 2"/>
-          <p:cNvSpPr>
-            <a:spLocks noGrp="1"/>
-          </p:cNvSpPr>
-          <p:nvPr>
-            <p:ph type="body" idx="1"/>
-          </p:nvPr>
-        </p:nvSpPr>
-        <p:spPr/>
-        <p:txBody>
-          <a:bodyPr/>
-          <a:lstStyle/>
-          <a:p>
-            <a:endParaRPr lang="en-US"/>
-          </a:p>
-        </p:txBody>
-      </p:sp>
-    </p:spTree>
-    <p:extLst>
-      <p:ext uri="{BB962C8B-B14F-4D97-AF65-F5344CB8AC3E}">
-        <p14:creationId xmlns:p14="http://schemas.microsoft.com/office/powerpoint/2010/main" val="1396715300"/>
-      </p:ext>
-    </p:extLst>
-  </p:cSld>
-  <p:clrMapOvr>
-    <a:masterClrMapping/>
-  </p:clrMapOvr>
-  <p:timing>
-    <p:tnLst>
-      <p:par>
-        <p:cTn xmlns:p14="http://schemas.microsoft.com/office/powerpoint/2010/main" id="1" dur="indefinite" restart="never" nodeType="tmRoot"/>
-      </p:par>
-    </p:tnLst>
-  </p:timing>
-</p:sld>
-</file>
-
-<file path=ppt/slides/slide5.xml><?xml version="1.0" encoding="utf-8"?>
-<p:sld xmlns:a="http://schemas.openxmlformats.org/drawingml/2006/main" xmlns:r="http://schemas.openxmlformats.org/officeDocument/2006/relationships" xmlns:p="http://schemas.openxmlformats.org/presentationml/2006/main">
-  <p:cSld>
-    <p:spTree>
-      <p:nvGrpSpPr>
-        <p:cNvPr id="1" name=""/>
-        <p:cNvGrpSpPr/>
-        <p:nvPr/>
-      </p:nvGrpSpPr>
-      <p:grpSpPr>
-        <a:xfrm>
-          <a:off x="0" y="0"/>
-          <a:ext cx="0" cy="0"/>
-          <a:chOff x="0" y="0"/>
-          <a:chExt cx="0" cy="0"/>
-        </a:xfrm>
-      </p:grpSpPr>
-      <p:sp>
-        <p:nvSpPr>
-          <p:cNvPr id="2" name="Title 1"/>
-          <p:cNvSpPr>
-            <a:spLocks noGrp="1"/>
-          </p:cNvSpPr>
-          <p:nvPr>
-            <p:ph type="title"/>
-          </p:nvPr>
-        </p:nvSpPr>
-        <p:spPr/>
-        <p:txBody>
-          <a:bodyPr/>
-          <a:lstStyle/>
-          <a:p>
-            <a:r>
-              <a:rPr lang="en-US" dirty="0" err="1" smtClean="0"/>
-              <a:t>AMDeSS</a:t>
-            </a:r>
-            <a:r>
-              <a:rPr lang="en-US" dirty="0" smtClean="0"/>
-              <a:t> Solution</a:t>
             </a:r>
             <a:endParaRPr lang="en-US" dirty="0"/>
           </a:p>
@@ -4712,7 +4431,7 @@
         </p:blipFill>
         <p:spPr>
           <a:xfrm>
-            <a:off x="5896666" y="2672522"/>
+            <a:off x="5885622" y="3103218"/>
             <a:ext cx="1795060" cy="2625034"/>
           </a:xfrm>
           <a:prstGeom prst="rect">
@@ -4767,6 +4486,16 @@
               </a:rPr>
               <a:t>www.telegraph.co.uk</a:t>
             </a:r>
+            <a:r>
+              <a:rPr lang="en-US" sz="1400" dirty="0" smtClean="0"/>
+              <a:t>	</a:t>
+            </a:r>
+            <a:r>
+              <a:rPr lang="en-US" sz="1400" dirty="0" err="1">
+                <a:hlinkClick r:id="rId7"/>
+              </a:rPr>
+              <a:t>www.clipartpanda.com</a:t>
+            </a:r>
             <a:endParaRPr lang="en-US" sz="1400" dirty="0" smtClean="0"/>
           </a:p>
         </p:txBody>
@@ -4780,15 +4509,63 @@
           <p:nvPr/>
         </p:nvPicPr>
         <p:blipFill>
-          <a:blip r:embed="rId7"/>
+          <a:blip r:embed="rId8"/>
           <a:stretch>
             <a:fillRect/>
           </a:stretch>
         </p:blipFill>
         <p:spPr>
           <a:xfrm>
-            <a:off x="7780130" y="3368262"/>
+            <a:off x="7769086" y="3798958"/>
             <a:ext cx="1458736" cy="910534"/>
+          </a:xfrm>
+          <a:prstGeom prst="rect">
+            <a:avLst/>
+          </a:prstGeom>
+        </p:spPr>
+      </p:pic>
+      <p:pic>
+        <p:nvPicPr>
+          <p:cNvPr id="4" name="Picture 3"/>
+          <p:cNvPicPr>
+            <a:picLocks noChangeAspect="1"/>
+          </p:cNvPicPr>
+          <p:nvPr/>
+        </p:nvPicPr>
+        <p:blipFill>
+          <a:blip r:embed="rId9"/>
+          <a:stretch>
+            <a:fillRect/>
+          </a:stretch>
+        </p:blipFill>
+        <p:spPr>
+          <a:xfrm rot="10800000">
+            <a:off x="7435021" y="3125304"/>
+            <a:ext cx="633921" cy="1174473"/>
+          </a:xfrm>
+          <a:prstGeom prst="rect">
+            <a:avLst/>
+          </a:prstGeom>
+        </p:spPr>
+      </p:pic>
+      <p:pic>
+        <p:nvPicPr>
+          <p:cNvPr id="9" name="Picture 8"/>
+          <p:cNvPicPr>
+            <a:picLocks noChangeAspect="1"/>
+          </p:cNvPicPr>
+          <p:nvPr/>
+        </p:nvPicPr>
+        <p:blipFill>
+          <a:blip r:embed="rId9"/>
+          <a:stretch>
+            <a:fillRect/>
+          </a:stretch>
+        </p:blipFill>
+        <p:spPr>
+          <a:xfrm>
+            <a:off x="2551595" y="2935355"/>
+            <a:ext cx="633921" cy="1174473"/>
           </a:xfrm>
           <a:prstGeom prst="rect">
             <a:avLst/>
@@ -4808,7 +4585,7 @@
 </p:sld>
 </file>
 
-<file path=ppt/slides/slide6.xml><?xml version="1.0" encoding="utf-8"?>
+<file path=ppt/slides/slide4.xml><?xml version="1.0" encoding="utf-8"?>
 <p:sld xmlns:a="http://schemas.openxmlformats.org/drawingml/2006/main" xmlns:r="http://schemas.openxmlformats.org/officeDocument/2006/relationships" xmlns:p="http://schemas.openxmlformats.org/presentationml/2006/main">
   <p:cSld>
     <p:spTree>
@@ -4887,7 +4664,7 @@
 </p:sld>
 </file>
 
-<file path=ppt/slides/slide7.xml><?xml version="1.0" encoding="utf-8"?>
+<file path=ppt/slides/slide5.xml><?xml version="1.0" encoding="utf-8"?>
 <p:sld xmlns:a="http://schemas.openxmlformats.org/drawingml/2006/main" xmlns:r="http://schemas.openxmlformats.org/officeDocument/2006/relationships" xmlns:p="http://schemas.openxmlformats.org/presentationml/2006/main">
   <p:cSld>
     <p:spTree>
@@ -5136,7 +4913,7 @@
 </p:sld>
 </file>
 
-<file path=ppt/slides/slide8.xml><?xml version="1.0" encoding="utf-8"?>
+<file path=ppt/slides/slide6.xml><?xml version="1.0" encoding="utf-8"?>
 <p:sld xmlns:a="http://schemas.openxmlformats.org/drawingml/2006/main" xmlns:r="http://schemas.openxmlformats.org/officeDocument/2006/relationships" xmlns:p="http://schemas.openxmlformats.org/presentationml/2006/main">
   <p:cSld>
     <p:spTree>
@@ -5317,16 +5094,6 @@
               </a:rPr>
               <a:t>http://simplisafe.com</a:t>
             </a:r>
-            <a:endParaRPr lang="en" sz="1400" u="sng" dirty="0">
-              <a:solidFill>
-                <a:schemeClr val="accent5"/>
-              </a:solidFill>
-              <a:latin typeface="Open Sans"/>
-              <a:ea typeface="Open Sans"/>
-              <a:cs typeface="Open Sans"/>
-              <a:sym typeface="Open Sans"/>
-              <a:hlinkClick r:id="rId4"/>
-            </a:endParaRPr>
           </a:p>
         </p:txBody>
       </p:sp>
@@ -5343,6 +5110,271 @@
   <p:transition xmlns:p14="http://schemas.microsoft.com/office/powerpoint/2010/main" spd="slow">
     <p:cut/>
   </p:transition>
+</p:sld>
+</file>
+
+<file path=ppt/slides/slide7.xml><?xml version="1.0" encoding="utf-8"?>
+<p:sld xmlns:a="http://schemas.openxmlformats.org/drawingml/2006/main" xmlns:r="http://schemas.openxmlformats.org/officeDocument/2006/relationships" xmlns:p="http://schemas.openxmlformats.org/presentationml/2006/main">
+  <p:cSld>
+    <p:spTree>
+      <p:nvGrpSpPr>
+        <p:cNvPr id="1" name=""/>
+        <p:cNvGrpSpPr/>
+        <p:nvPr/>
+      </p:nvGrpSpPr>
+      <p:grpSpPr>
+        <a:xfrm>
+          <a:off x="0" y="0"/>
+          <a:ext cx="0" cy="0"/>
+          <a:chOff x="0" y="0"/>
+          <a:chExt cx="0" cy="0"/>
+        </a:xfrm>
+      </p:grpSpPr>
+      <p:sp>
+        <p:nvSpPr>
+          <p:cNvPr id="2" name="Title 1"/>
+          <p:cNvSpPr>
+            <a:spLocks noGrp="1"/>
+          </p:cNvSpPr>
+          <p:nvPr>
+            <p:ph type="title"/>
+          </p:nvPr>
+        </p:nvSpPr>
+        <p:spPr/>
+        <p:txBody>
+          <a:bodyPr/>
+          <a:lstStyle/>
+          <a:p>
+            <a:r>
+              <a:rPr lang="en-US" dirty="0" smtClean="0"/>
+              <a:t>BLE Profile Implementation</a:t>
+            </a:r>
+            <a:endParaRPr lang="en-US" dirty="0"/>
+          </a:p>
+        </p:txBody>
+      </p:sp>
+      <p:sp>
+        <p:nvSpPr>
+          <p:cNvPr id="3" name="Content Placeholder 2"/>
+          <p:cNvSpPr>
+            <a:spLocks noGrp="1"/>
+          </p:cNvSpPr>
+          <p:nvPr>
+            <p:ph idx="1"/>
+          </p:nvPr>
+        </p:nvSpPr>
+        <p:spPr/>
+        <p:txBody>
+          <a:bodyPr/>
+          <a:lstStyle/>
+          <a:p>
+            <a:r>
+              <a:rPr lang="en-US" dirty="0" smtClean="0"/>
+              <a:t>Defined a custom BLE service</a:t>
+            </a:r>
+          </a:p>
+          <a:p>
+            <a:pPr lvl="1"/>
+            <a:r>
+              <a:rPr lang="en-US" dirty="0" smtClean="0"/>
+              <a:t>Arm state characteristic</a:t>
+            </a:r>
+          </a:p>
+          <a:p>
+            <a:pPr lvl="2"/>
+            <a:r>
+              <a:rPr lang="en-US" dirty="0" smtClean="0"/>
+              <a:t>Read/write</a:t>
+            </a:r>
+          </a:p>
+          <a:p>
+            <a:pPr lvl="2"/>
+            <a:r>
+              <a:rPr lang="en-US" dirty="0" smtClean="0"/>
+              <a:t>0 – disarmed</a:t>
+            </a:r>
+          </a:p>
+          <a:p>
+            <a:pPr lvl="2"/>
+            <a:r>
+              <a:rPr lang="en-US" dirty="0" smtClean="0"/>
+              <a:t>1 – armed</a:t>
+            </a:r>
+          </a:p>
+          <a:p>
+            <a:pPr lvl="1"/>
+            <a:r>
+              <a:rPr lang="en-US" dirty="0" smtClean="0"/>
+              <a:t>Alarm characteristic</a:t>
+            </a:r>
+          </a:p>
+          <a:p>
+            <a:pPr lvl="2"/>
+            <a:r>
+              <a:rPr lang="en-US" dirty="0" smtClean="0"/>
+              <a:t>Notify only</a:t>
+            </a:r>
+          </a:p>
+          <a:p>
+            <a:pPr lvl="2"/>
+            <a:r>
+              <a:rPr lang="en-US" dirty="0" smtClean="0"/>
+              <a:t>0 – </a:t>
+            </a:r>
+            <a:r>
+              <a:rPr lang="en-US" dirty="0"/>
+              <a:t>N</a:t>
+            </a:r>
+            <a:r>
+              <a:rPr lang="en-US" dirty="0" smtClean="0"/>
+              <a:t>o alarm</a:t>
+            </a:r>
+          </a:p>
+          <a:p>
+            <a:pPr lvl="2"/>
+            <a:r>
+              <a:rPr lang="en-US" dirty="0" smtClean="0"/>
+              <a:t>1 – Alarm</a:t>
+            </a:r>
+          </a:p>
+        </p:txBody>
+      </p:sp>
+    </p:spTree>
+    <p:extLst>
+      <p:ext uri="{BB962C8B-B14F-4D97-AF65-F5344CB8AC3E}">
+        <p14:creationId xmlns:p14="http://schemas.microsoft.com/office/powerpoint/2010/main" val="1998885270"/>
+      </p:ext>
+    </p:extLst>
+  </p:cSld>
+  <p:clrMapOvr>
+    <a:masterClrMapping/>
+  </p:clrMapOvr>
+</p:sld>
+</file>
+
+<file path=ppt/slides/slide8.xml><?xml version="1.0" encoding="utf-8"?>
+<p:sld xmlns:a="http://schemas.openxmlformats.org/drawingml/2006/main" xmlns:r="http://schemas.openxmlformats.org/officeDocument/2006/relationships" xmlns:p="http://schemas.openxmlformats.org/presentationml/2006/main">
+  <p:cSld>
+    <p:spTree>
+      <p:nvGrpSpPr>
+        <p:cNvPr id="1" name=""/>
+        <p:cNvGrpSpPr/>
+        <p:nvPr/>
+      </p:nvGrpSpPr>
+      <p:grpSpPr>
+        <a:xfrm>
+          <a:off x="0" y="0"/>
+          <a:ext cx="0" cy="0"/>
+          <a:chOff x="0" y="0"/>
+          <a:chExt cx="0" cy="0"/>
+        </a:xfrm>
+      </p:grpSpPr>
+      <p:sp>
+        <p:nvSpPr>
+          <p:cNvPr id="2" name="Title 1"/>
+          <p:cNvSpPr>
+            <a:spLocks noGrp="1"/>
+          </p:cNvSpPr>
+          <p:nvPr>
+            <p:ph type="title"/>
+          </p:nvPr>
+        </p:nvSpPr>
+        <p:spPr/>
+        <p:txBody>
+          <a:bodyPr/>
+          <a:lstStyle/>
+          <a:p>
+            <a:r>
+              <a:rPr lang="en-US" dirty="0" smtClean="0"/>
+              <a:t>Unexpected Issues</a:t>
+            </a:r>
+            <a:endParaRPr lang="en-US" dirty="0"/>
+          </a:p>
+        </p:txBody>
+      </p:sp>
+      <p:sp>
+        <p:nvSpPr>
+          <p:cNvPr id="3" name="Content Placeholder 2"/>
+          <p:cNvSpPr>
+            <a:spLocks noGrp="1"/>
+          </p:cNvSpPr>
+          <p:nvPr>
+            <p:ph idx="1"/>
+          </p:nvPr>
+        </p:nvSpPr>
+        <p:spPr/>
+        <p:txBody>
+          <a:bodyPr>
+            <a:noAutofit/>
+          </a:bodyPr>
+          <a:lstStyle/>
+          <a:p>
+            <a:r>
+              <a:rPr lang="en-US" dirty="0" smtClean="0"/>
+              <a:t>Getting Over-The-Air programming to work was slower than expected</a:t>
+            </a:r>
+          </a:p>
+          <a:p>
+            <a:pPr lvl="1"/>
+            <a:r>
+              <a:rPr lang="en-US" dirty="0" smtClean="0"/>
+              <a:t>Needed a BL620 dongle for OTA to work (this was not immediately obvious)</a:t>
+            </a:r>
+          </a:p>
+          <a:p>
+            <a:pPr lvl="1"/>
+            <a:r>
+              <a:rPr lang="en-US" dirty="0" smtClean="0"/>
+              <a:t>Development kit pin configuration example confusion</a:t>
+            </a:r>
+          </a:p>
+          <a:p>
+            <a:r>
+              <a:rPr lang="en-US" dirty="0" smtClean="0"/>
+              <a:t>Unable to get the MMA8653FC accelerometer on Dr. </a:t>
+            </a:r>
+            <a:r>
+              <a:rPr lang="en-US" dirty="0" err="1" smtClean="0"/>
+              <a:t>Jovanov’s</a:t>
+            </a:r>
+            <a:r>
+              <a:rPr lang="en-US" dirty="0" smtClean="0"/>
+              <a:t> development board to work</a:t>
+            </a:r>
+          </a:p>
+          <a:p>
+            <a:pPr lvl="1"/>
+            <a:r>
+              <a:rPr lang="en-US" dirty="0" smtClean="0"/>
+              <a:t>Verified the I2C signals coming from the BL600 were correct</a:t>
+            </a:r>
+          </a:p>
+          <a:p>
+            <a:pPr lvl="1"/>
+            <a:r>
+              <a:rPr lang="en-US" dirty="0" smtClean="0"/>
+              <a:t>Verified the BL600 could communicate over I2C to the capacitance-to-digital converter</a:t>
+            </a:r>
+          </a:p>
+          <a:p>
+            <a:pPr lvl="1"/>
+            <a:r>
+              <a:rPr lang="en-US" dirty="0" smtClean="0"/>
+              <a:t>Tried 3 different development boards</a:t>
+            </a:r>
+          </a:p>
+        </p:txBody>
+      </p:sp>
+    </p:spTree>
+    <p:extLst>
+      <p:ext uri="{BB962C8B-B14F-4D97-AF65-F5344CB8AC3E}">
+        <p14:creationId xmlns:p14="http://schemas.microsoft.com/office/powerpoint/2010/main" val="2191538965"/>
+      </p:ext>
+    </p:extLst>
+  </p:cSld>
+  <p:clrMapOvr>
+    <a:masterClrMapping/>
+  </p:clrMapOvr>
 </p:sld>
 </file>
 
@@ -5380,7 +5412,7 @@
           <a:p>
             <a:r>
               <a:rPr lang="en-US" dirty="0" smtClean="0"/>
-              <a:t>Solution Details</a:t>
+              <a:t>Modified Project</a:t>
             </a:r>
             <a:endParaRPr lang="en-US" dirty="0"/>
           </a:p>
@@ -5388,12 +5420,12 @@
       </p:sp>
       <p:sp>
         <p:nvSpPr>
-          <p:cNvPr id="3" name="Text Placeholder 2"/>
-          <p:cNvSpPr>
-            <a:spLocks noGrp="1"/>
-          </p:cNvSpPr>
-          <p:nvPr>
-            <p:ph type="body" idx="1"/>
+          <p:cNvPr id="3" name="Content Placeholder 2"/>
+          <p:cNvSpPr>
+            <a:spLocks noGrp="1"/>
+          </p:cNvSpPr>
+          <p:nvPr>
+            <p:ph idx="1"/>
           </p:nvPr>
         </p:nvSpPr>
         <p:spPr/>
@@ -5401,27 +5433,30 @@
           <a:bodyPr/>
           <a:lstStyle/>
           <a:p>
-            <a:endParaRPr lang="en-US"/>
+            <a:r>
+              <a:rPr lang="en-US" dirty="0" smtClean="0"/>
+              <a:t>Use the capacitance-to-digital converter with a touch sensor attached to a water bottle</a:t>
+            </a:r>
+          </a:p>
+          <a:p>
+            <a:r>
+              <a:rPr lang="en-US" dirty="0" smtClean="0"/>
+              <a:t>Grasping the water bottle will be treated as the alarm condition</a:t>
+            </a:r>
+            <a:endParaRPr lang="en-US" dirty="0"/>
           </a:p>
         </p:txBody>
       </p:sp>
     </p:spTree>
     <p:extLst>
       <p:ext uri="{BB962C8B-B14F-4D97-AF65-F5344CB8AC3E}">
-        <p14:creationId xmlns:p14="http://schemas.microsoft.com/office/powerpoint/2010/main" val="4274845844"/>
+        <p14:creationId xmlns:p14="http://schemas.microsoft.com/office/powerpoint/2010/main" val="427497236"/>
       </p:ext>
     </p:extLst>
   </p:cSld>
   <p:clrMapOvr>
     <a:masterClrMapping/>
   </p:clrMapOvr>
-  <p:timing>
-    <p:tnLst>
-      <p:par>
-        <p:cTn xmlns:p14="http://schemas.microsoft.com/office/powerpoint/2010/main" id="1" dur="indefinite" restart="never" nodeType="tmRoot"/>
-      </p:par>
-    </p:tnLst>
-  </p:timing>
 </p:sld>
 </file>
 
@@ -5680,7 +5715,7 @@
   <a:extraClrSchemeLst/>
   <a:extLst>
     <a:ext uri="{05A4C25C-085E-4340-85A3-A5531E510DB2}">
-      <thm15:themeFamily xmlns:thm15="http://schemas.microsoft.com/office/thememl/2012/main" xmlns="" name="Office Theme" id="{62F939B6-93AF-4DB8-9C6B-D6C7DFDC589F}" vid="{4A3C46E8-61CC-4603-A589-7422A47A8E4A}"/>
+      <thm15:themeFamily xmlns="" xmlns:thm15="http://schemas.microsoft.com/office/thememl/2012/main" name="Office Theme" id="{62F939B6-93AF-4DB8-9C6B-D6C7DFDC589F}" vid="{4A3C46E8-61CC-4603-A589-7422A47A8E4A}"/>
     </a:ext>
   </a:extLst>
 </a:theme>

</xml_diff>

<commit_message>
Adding market research comparision
</commit_message>
<xml_diff>
--- a/docs/AMDeSS_FinalPresentation.pptx
+++ b/docs/AMDeSS_FinalPresentation.pptx
@@ -5,7 +5,7 @@
     <p:sldMasterId id="2147483648" r:id="rId1"/>
   </p:sldMasterIdLst>
   <p:notesMasterIdLst>
-    <p:notesMasterId r:id="rId14"/>
+    <p:notesMasterId r:id="rId17"/>
   </p:notesMasterIdLst>
   <p:sldIdLst>
     <p:sldId id="256" r:id="rId2"/>
@@ -14,12 +14,15 @@
     <p:sldId id="273" r:id="rId5"/>
     <p:sldId id="283" r:id="rId6"/>
     <p:sldId id="284" r:id="rId7"/>
-    <p:sldId id="285" r:id="rId8"/>
-    <p:sldId id="286" r:id="rId9"/>
-    <p:sldId id="287" r:id="rId10"/>
-    <p:sldId id="288" r:id="rId11"/>
-    <p:sldId id="269" r:id="rId12"/>
-    <p:sldId id="271" r:id="rId13"/>
+    <p:sldId id="289" r:id="rId8"/>
+    <p:sldId id="290" r:id="rId9"/>
+    <p:sldId id="291" r:id="rId10"/>
+    <p:sldId id="285" r:id="rId11"/>
+    <p:sldId id="286" r:id="rId12"/>
+    <p:sldId id="287" r:id="rId13"/>
+    <p:sldId id="288" r:id="rId14"/>
+    <p:sldId id="269" r:id="rId15"/>
+    <p:sldId id="271" r:id="rId16"/>
   </p:sldIdLst>
   <p:sldSz cx="12192000" cy="6858000"/>
   <p:notesSz cx="6858000" cy="9144000"/>
@@ -3932,7 +3935,7 @@
           <a:p>
             <a:r>
               <a:rPr lang="en-US" dirty="0" smtClean="0"/>
-              <a:t>Project Test Plan</a:t>
+              <a:t>BLE Profile Implementation</a:t>
             </a:r>
             <a:endParaRPr lang="en-US" dirty="0"/>
           </a:p>
@@ -3950,65 +3953,84 @@
         </p:nvSpPr>
         <p:spPr/>
         <p:txBody>
-          <a:bodyPr>
-            <a:normAutofit lnSpcReduction="10000"/>
-          </a:bodyPr>
+          <a:bodyPr/>
           <a:lstStyle/>
           <a:p>
             <a:r>
               <a:rPr lang="en-US" dirty="0" smtClean="0"/>
-              <a:t>Verify the app can pair with the device when the device is powered</a:t>
-            </a:r>
-          </a:p>
-          <a:p>
+              <a:t>Defined a custom BLE service</a:t>
+            </a:r>
+          </a:p>
+          <a:p>
+            <a:pPr lvl="1"/>
             <a:r>
               <a:rPr lang="en-US" dirty="0" smtClean="0"/>
-              <a:t>Verify the device is shown to be initially disarmed in app</a:t>
-            </a:r>
-          </a:p>
-          <a:p>
+              <a:t>Arm state characteristic</a:t>
+            </a:r>
+          </a:p>
+          <a:p>
+            <a:pPr lvl="2"/>
             <a:r>
               <a:rPr lang="en-US" dirty="0" smtClean="0"/>
-              <a:t>Verify the device does not trigger an alarm when in disarm state</a:t>
-            </a:r>
-          </a:p>
-          <a:p>
+              <a:t>Read/write</a:t>
+            </a:r>
+          </a:p>
+          <a:p>
+            <a:pPr lvl="2"/>
             <a:r>
               <a:rPr lang="en-US" dirty="0" smtClean="0"/>
-              <a:t>Verify the device can be armed from app</a:t>
-            </a:r>
-          </a:p>
-          <a:p>
+              <a:t>0 – disarmed</a:t>
+            </a:r>
+          </a:p>
+          <a:p>
+            <a:pPr lvl="2"/>
             <a:r>
               <a:rPr lang="en-US" dirty="0" smtClean="0"/>
-              <a:t>Verify the device triggers an alarm when in armed state</a:t>
-            </a:r>
-          </a:p>
-          <a:p>
+              <a:t>1 – armed</a:t>
+            </a:r>
+          </a:p>
+          <a:p>
+            <a:pPr lvl="1"/>
             <a:r>
               <a:rPr lang="en-US" dirty="0" smtClean="0"/>
-              <a:t>Verify the alarm is triggered when the water bottle is grasped with the whole hand</a:t>
-            </a:r>
-          </a:p>
-          <a:p>
+              <a:t>Alarm characteristic</a:t>
+            </a:r>
+          </a:p>
+          <a:p>
+            <a:pPr lvl="2"/>
             <a:r>
               <a:rPr lang="en-US" dirty="0" smtClean="0"/>
-              <a:t>Verify the app alerts the user when the alarm is triggered</a:t>
-            </a:r>
-          </a:p>
-          <a:p>
+              <a:t>Notify only</a:t>
+            </a:r>
+          </a:p>
+          <a:p>
+            <a:pPr lvl="2"/>
             <a:r>
               <a:rPr lang="en-US" dirty="0" smtClean="0"/>
-              <a:t>Verify the app can disarm the device when it is in the alarm state</a:t>
-            </a:r>
-            <a:endParaRPr lang="en-US" dirty="0"/>
+              <a:t>0 – </a:t>
+            </a:r>
+            <a:r>
+              <a:rPr lang="en-US" dirty="0"/>
+              <a:t>N</a:t>
+            </a:r>
+            <a:r>
+              <a:rPr lang="en-US" dirty="0" smtClean="0"/>
+              <a:t>o alarm</a:t>
+            </a:r>
+          </a:p>
+          <a:p>
+            <a:pPr lvl="2"/>
+            <a:r>
+              <a:rPr lang="en-US" dirty="0" smtClean="0"/>
+              <a:t>1 – Alarm</a:t>
+            </a:r>
           </a:p>
         </p:txBody>
       </p:sp>
     </p:spTree>
     <p:extLst>
       <p:ext uri="{BB962C8B-B14F-4D97-AF65-F5344CB8AC3E}">
-        <p14:creationId xmlns:p14="http://schemas.microsoft.com/office/powerpoint/2010/main" val="117820973"/>
+        <p14:creationId xmlns:p14="http://schemas.microsoft.com/office/powerpoint/2010/main" val="1998885270"/>
       </p:ext>
     </p:extLst>
   </p:cSld>
@@ -4047,6 +4069,338 @@
         </p:nvSpPr>
         <p:spPr/>
         <p:txBody>
+          <a:bodyPr/>
+          <a:lstStyle/>
+          <a:p>
+            <a:r>
+              <a:rPr lang="en-US" dirty="0" smtClean="0"/>
+              <a:t>Unexpected Issues</a:t>
+            </a:r>
+            <a:endParaRPr lang="en-US" dirty="0"/>
+          </a:p>
+        </p:txBody>
+      </p:sp>
+      <p:sp>
+        <p:nvSpPr>
+          <p:cNvPr id="3" name="Content Placeholder 2"/>
+          <p:cNvSpPr>
+            <a:spLocks noGrp="1"/>
+          </p:cNvSpPr>
+          <p:nvPr>
+            <p:ph idx="1"/>
+          </p:nvPr>
+        </p:nvSpPr>
+        <p:spPr/>
+        <p:txBody>
+          <a:bodyPr>
+            <a:noAutofit/>
+          </a:bodyPr>
+          <a:lstStyle/>
+          <a:p>
+            <a:r>
+              <a:rPr lang="en-US" dirty="0" smtClean="0"/>
+              <a:t>Getting Over-The-Air programming to work was slower than expected</a:t>
+            </a:r>
+          </a:p>
+          <a:p>
+            <a:pPr lvl="1"/>
+            <a:r>
+              <a:rPr lang="en-US" dirty="0" smtClean="0"/>
+              <a:t>Needed a BL620 dongle for OTA to work (this was not immediately obvious)</a:t>
+            </a:r>
+          </a:p>
+          <a:p>
+            <a:pPr lvl="1"/>
+            <a:r>
+              <a:rPr lang="en-US" dirty="0" smtClean="0"/>
+              <a:t>Development kit pin configuration example confusion</a:t>
+            </a:r>
+          </a:p>
+          <a:p>
+            <a:r>
+              <a:rPr lang="en-US" dirty="0" smtClean="0"/>
+              <a:t>Unable to get the MMA8653FC accelerometer on Dr. </a:t>
+            </a:r>
+            <a:r>
+              <a:rPr lang="en-US" dirty="0" err="1" smtClean="0"/>
+              <a:t>Jovanov’s</a:t>
+            </a:r>
+            <a:r>
+              <a:rPr lang="en-US" dirty="0" smtClean="0"/>
+              <a:t> development board to work</a:t>
+            </a:r>
+          </a:p>
+          <a:p>
+            <a:pPr lvl="1"/>
+            <a:r>
+              <a:rPr lang="en-US" dirty="0" smtClean="0"/>
+              <a:t>Verified the I2C signals coming from the BL600 were correct</a:t>
+            </a:r>
+          </a:p>
+          <a:p>
+            <a:pPr lvl="1"/>
+            <a:r>
+              <a:rPr lang="en-US" dirty="0" smtClean="0"/>
+              <a:t>Verified the BL600 could communicate over I2C to the capacitance-to-digital converter</a:t>
+            </a:r>
+          </a:p>
+          <a:p>
+            <a:pPr lvl="1"/>
+            <a:r>
+              <a:rPr lang="en-US" dirty="0" smtClean="0"/>
+              <a:t>Tried 3 different development boards</a:t>
+            </a:r>
+          </a:p>
+        </p:txBody>
+      </p:sp>
+    </p:spTree>
+    <p:extLst>
+      <p:ext uri="{BB962C8B-B14F-4D97-AF65-F5344CB8AC3E}">
+        <p14:creationId xmlns:p14="http://schemas.microsoft.com/office/powerpoint/2010/main" val="2191538965"/>
+      </p:ext>
+    </p:extLst>
+  </p:cSld>
+  <p:clrMapOvr>
+    <a:masterClrMapping/>
+  </p:clrMapOvr>
+</p:sld>
+</file>
+
+<file path=ppt/slides/slide12.xml><?xml version="1.0" encoding="utf-8"?>
+<p:sld xmlns:a="http://schemas.openxmlformats.org/drawingml/2006/main" xmlns:r="http://schemas.openxmlformats.org/officeDocument/2006/relationships" xmlns:p="http://schemas.openxmlformats.org/presentationml/2006/main">
+  <p:cSld>
+    <p:spTree>
+      <p:nvGrpSpPr>
+        <p:cNvPr id="1" name=""/>
+        <p:cNvGrpSpPr/>
+        <p:nvPr/>
+      </p:nvGrpSpPr>
+      <p:grpSpPr>
+        <a:xfrm>
+          <a:off x="0" y="0"/>
+          <a:ext cx="0" cy="0"/>
+          <a:chOff x="0" y="0"/>
+          <a:chExt cx="0" cy="0"/>
+        </a:xfrm>
+      </p:grpSpPr>
+      <p:sp>
+        <p:nvSpPr>
+          <p:cNvPr id="2" name="Title 1"/>
+          <p:cNvSpPr>
+            <a:spLocks noGrp="1"/>
+          </p:cNvSpPr>
+          <p:nvPr>
+            <p:ph type="title"/>
+          </p:nvPr>
+        </p:nvSpPr>
+        <p:spPr/>
+        <p:txBody>
+          <a:bodyPr/>
+          <a:lstStyle/>
+          <a:p>
+            <a:r>
+              <a:rPr lang="en-US" dirty="0" smtClean="0"/>
+              <a:t>Modified </a:t>
+            </a:r>
+            <a:r>
+              <a:rPr lang="en-US" dirty="0" smtClean="0"/>
+              <a:t>Project Approach</a:t>
+            </a:r>
+            <a:endParaRPr lang="en-US" dirty="0"/>
+          </a:p>
+        </p:txBody>
+      </p:sp>
+      <p:sp>
+        <p:nvSpPr>
+          <p:cNvPr id="3" name="Content Placeholder 2"/>
+          <p:cNvSpPr>
+            <a:spLocks noGrp="1"/>
+          </p:cNvSpPr>
+          <p:nvPr>
+            <p:ph idx="1"/>
+          </p:nvPr>
+        </p:nvSpPr>
+        <p:spPr/>
+        <p:txBody>
+          <a:bodyPr/>
+          <a:lstStyle/>
+          <a:p>
+            <a:r>
+              <a:rPr lang="en-US" dirty="0" smtClean="0"/>
+              <a:t>Use the capacitance-to-digital converter with a touch sensor attached to a water bottle</a:t>
+            </a:r>
+          </a:p>
+          <a:p>
+            <a:r>
+              <a:rPr lang="en-US" dirty="0" smtClean="0"/>
+              <a:t>Grasping the water bottle will be treated as the alarm condition</a:t>
+            </a:r>
+            <a:endParaRPr lang="en-US" dirty="0"/>
+          </a:p>
+        </p:txBody>
+      </p:sp>
+    </p:spTree>
+    <p:extLst>
+      <p:ext uri="{BB962C8B-B14F-4D97-AF65-F5344CB8AC3E}">
+        <p14:creationId xmlns:p14="http://schemas.microsoft.com/office/powerpoint/2010/main" val="427497236"/>
+      </p:ext>
+    </p:extLst>
+  </p:cSld>
+  <p:clrMapOvr>
+    <a:masterClrMapping/>
+  </p:clrMapOvr>
+</p:sld>
+</file>
+
+<file path=ppt/slides/slide13.xml><?xml version="1.0" encoding="utf-8"?>
+<p:sld xmlns:a="http://schemas.openxmlformats.org/drawingml/2006/main" xmlns:r="http://schemas.openxmlformats.org/officeDocument/2006/relationships" xmlns:p="http://schemas.openxmlformats.org/presentationml/2006/main">
+  <p:cSld>
+    <p:spTree>
+      <p:nvGrpSpPr>
+        <p:cNvPr id="1" name=""/>
+        <p:cNvGrpSpPr/>
+        <p:nvPr/>
+      </p:nvGrpSpPr>
+      <p:grpSpPr>
+        <a:xfrm>
+          <a:off x="0" y="0"/>
+          <a:ext cx="0" cy="0"/>
+          <a:chOff x="0" y="0"/>
+          <a:chExt cx="0" cy="0"/>
+        </a:xfrm>
+      </p:grpSpPr>
+      <p:sp>
+        <p:nvSpPr>
+          <p:cNvPr id="2" name="Title 1"/>
+          <p:cNvSpPr>
+            <a:spLocks noGrp="1"/>
+          </p:cNvSpPr>
+          <p:nvPr>
+            <p:ph type="title"/>
+          </p:nvPr>
+        </p:nvSpPr>
+        <p:spPr/>
+        <p:txBody>
+          <a:bodyPr/>
+          <a:lstStyle/>
+          <a:p>
+            <a:r>
+              <a:rPr lang="en-US" dirty="0" smtClean="0"/>
+              <a:t>Project Test Plan</a:t>
+            </a:r>
+            <a:endParaRPr lang="en-US" dirty="0"/>
+          </a:p>
+        </p:txBody>
+      </p:sp>
+      <p:sp>
+        <p:nvSpPr>
+          <p:cNvPr id="3" name="Content Placeholder 2"/>
+          <p:cNvSpPr>
+            <a:spLocks noGrp="1"/>
+          </p:cNvSpPr>
+          <p:nvPr>
+            <p:ph idx="1"/>
+          </p:nvPr>
+        </p:nvSpPr>
+        <p:spPr/>
+        <p:txBody>
+          <a:bodyPr>
+            <a:normAutofit lnSpcReduction="10000"/>
+          </a:bodyPr>
+          <a:lstStyle/>
+          <a:p>
+            <a:r>
+              <a:rPr lang="en-US" dirty="0" smtClean="0"/>
+              <a:t>Verify the app can pair with the device when the device is powered</a:t>
+            </a:r>
+          </a:p>
+          <a:p>
+            <a:r>
+              <a:rPr lang="en-US" dirty="0" smtClean="0"/>
+              <a:t>Verify the device is shown to be initially disarmed in app</a:t>
+            </a:r>
+          </a:p>
+          <a:p>
+            <a:r>
+              <a:rPr lang="en-US" dirty="0" smtClean="0"/>
+              <a:t>Verify the device does not trigger an alarm when in disarm state</a:t>
+            </a:r>
+          </a:p>
+          <a:p>
+            <a:r>
+              <a:rPr lang="en-US" dirty="0" smtClean="0"/>
+              <a:t>Verify the device can be armed from app</a:t>
+            </a:r>
+          </a:p>
+          <a:p>
+            <a:r>
+              <a:rPr lang="en-US" dirty="0" smtClean="0"/>
+              <a:t>Verify the device triggers an alarm when in armed state</a:t>
+            </a:r>
+          </a:p>
+          <a:p>
+            <a:r>
+              <a:rPr lang="en-US" dirty="0" smtClean="0"/>
+              <a:t>Verify the alarm is triggered when the water bottle is grasped with the whole hand</a:t>
+            </a:r>
+          </a:p>
+          <a:p>
+            <a:r>
+              <a:rPr lang="en-US" dirty="0" smtClean="0"/>
+              <a:t>Verify the app alerts the user when the alarm is triggered</a:t>
+            </a:r>
+          </a:p>
+          <a:p>
+            <a:r>
+              <a:rPr lang="en-US" dirty="0" smtClean="0"/>
+              <a:t>Verify the app can disarm the device when it is in the alarm state</a:t>
+            </a:r>
+            <a:endParaRPr lang="en-US" dirty="0"/>
+          </a:p>
+        </p:txBody>
+      </p:sp>
+    </p:spTree>
+    <p:extLst>
+      <p:ext uri="{BB962C8B-B14F-4D97-AF65-F5344CB8AC3E}">
+        <p14:creationId xmlns:p14="http://schemas.microsoft.com/office/powerpoint/2010/main" val="117820973"/>
+      </p:ext>
+    </p:extLst>
+  </p:cSld>
+  <p:clrMapOvr>
+    <a:masterClrMapping/>
+  </p:clrMapOvr>
+</p:sld>
+</file>
+
+<file path=ppt/slides/slide14.xml><?xml version="1.0" encoding="utf-8"?>
+<p:sld xmlns:a="http://schemas.openxmlformats.org/drawingml/2006/main" xmlns:r="http://schemas.openxmlformats.org/officeDocument/2006/relationships" xmlns:p="http://schemas.openxmlformats.org/presentationml/2006/main">
+  <p:cSld>
+    <p:spTree>
+      <p:nvGrpSpPr>
+        <p:cNvPr id="1" name=""/>
+        <p:cNvGrpSpPr/>
+        <p:nvPr/>
+      </p:nvGrpSpPr>
+      <p:grpSpPr>
+        <a:xfrm>
+          <a:off x="0" y="0"/>
+          <a:ext cx="0" cy="0"/>
+          <a:chOff x="0" y="0"/>
+          <a:chExt cx="0" cy="0"/>
+        </a:xfrm>
+      </p:grpSpPr>
+      <p:sp>
+        <p:nvSpPr>
+          <p:cNvPr id="2" name="Title 1"/>
+          <p:cNvSpPr>
+            <a:spLocks noGrp="1"/>
+          </p:cNvSpPr>
+          <p:nvPr>
+            <p:ph type="title"/>
+          </p:nvPr>
+        </p:nvSpPr>
+        <p:spPr/>
+        <p:txBody>
           <a:bodyPr>
             <a:normAutofit/>
           </a:bodyPr>
@@ -4099,7 +4453,7 @@
 </p:sld>
 </file>
 
-<file path=ppt/slides/slide12.xml><?xml version="1.0" encoding="utf-8"?>
+<file path=ppt/slides/slide15.xml><?xml version="1.0" encoding="utf-8"?>
 <p:sld xmlns:a="http://schemas.openxmlformats.org/drawingml/2006/main" xmlns:r="http://schemas.openxmlformats.org/officeDocument/2006/relationships" xmlns:p="http://schemas.openxmlformats.org/presentationml/2006/main">
   <p:cSld>
     <p:spTree>
@@ -5146,8 +5500,12 @@
           <a:lstStyle/>
           <a:p>
             <a:r>
+              <a:rPr lang="en-US" dirty="0" err="1" smtClean="0"/>
+              <a:t>AMDeSS</a:t>
+            </a:r>
+            <a:r>
               <a:rPr lang="en-US" dirty="0" smtClean="0"/>
-              <a:t>BLE Profile Implementation</a:t>
+              <a:t> vs. Existing Products</a:t>
             </a:r>
             <a:endParaRPr lang="en-US" dirty="0"/>
           </a:p>
@@ -5163,86 +5521,124 @@
             <p:ph idx="1"/>
           </p:nvPr>
         </p:nvSpPr>
-        <p:spPr/>
-        <p:txBody>
-          <a:bodyPr/>
-          <a:lstStyle/>
-          <a:p>
+        <p:spPr>
+          <a:xfrm>
+            <a:off x="838200" y="1825625"/>
+            <a:ext cx="7505835" cy="4351338"/>
+          </a:xfrm>
+        </p:spPr>
+        <p:txBody>
+          <a:bodyPr/>
+          <a:lstStyle/>
+          <a:p>
+            <a:r>
+              <a:rPr lang="en-US" dirty="0" err="1" smtClean="0"/>
+              <a:t>AMDeSS</a:t>
+            </a:r>
             <a:r>
               <a:rPr lang="en-US" dirty="0" smtClean="0"/>
-              <a:t>Defined a custom BLE service</a:t>
-            </a:r>
-          </a:p>
-          <a:p>
-            <a:pPr lvl="1"/>
+              <a:t> leverages Bluetooth to allow easy mobile deployment</a:t>
+            </a:r>
+          </a:p>
+          <a:p>
+            <a:r>
+              <a:rPr lang="en-US" dirty="0" err="1" smtClean="0"/>
+              <a:t>AMDeSS</a:t>
+            </a:r>
             <a:r>
               <a:rPr lang="en-US" dirty="0" smtClean="0"/>
-              <a:t>Arm state characteristic</a:t>
-            </a:r>
-          </a:p>
-          <a:p>
-            <a:pPr lvl="2"/>
+              <a:t>  can </a:t>
+            </a:r>
+            <a:r>
+              <a:rPr lang="en-US" smtClean="0"/>
+              <a:t>be used to complement </a:t>
+            </a:r>
             <a:r>
               <a:rPr lang="en-US" dirty="0" smtClean="0"/>
-              <a:t>Read/write</a:t>
-            </a:r>
-          </a:p>
-          <a:p>
-            <a:pPr lvl="2"/>
-            <a:r>
-              <a:rPr lang="en-US" dirty="0" smtClean="0"/>
-              <a:t>0 – disarmed</a:t>
-            </a:r>
-          </a:p>
-          <a:p>
-            <a:pPr lvl="2"/>
-            <a:r>
-              <a:rPr lang="en-US" dirty="0" smtClean="0"/>
-              <a:t>1 – armed</a:t>
-            </a:r>
-          </a:p>
-          <a:p>
-            <a:pPr lvl="1"/>
-            <a:r>
-              <a:rPr lang="en-US" dirty="0" smtClean="0"/>
-              <a:t>Alarm characteristic</a:t>
-            </a:r>
-          </a:p>
-          <a:p>
-            <a:pPr lvl="2"/>
-            <a:r>
-              <a:rPr lang="en-US" dirty="0" smtClean="0"/>
-              <a:t>Notify only</a:t>
-            </a:r>
-          </a:p>
-          <a:p>
-            <a:pPr lvl="2"/>
-            <a:r>
-              <a:rPr lang="en-US" dirty="0" smtClean="0"/>
-              <a:t>0 – </a:t>
-            </a:r>
-            <a:r>
-              <a:rPr lang="en-US" dirty="0"/>
-              <a:t>N</a:t>
-            </a:r>
-            <a:r>
-              <a:rPr lang="en-US" dirty="0" smtClean="0"/>
-              <a:t>o alarm</a:t>
-            </a:r>
-          </a:p>
-          <a:p>
-            <a:pPr lvl="2"/>
-            <a:r>
-              <a:rPr lang="en-US" dirty="0" smtClean="0"/>
-              <a:t>1 – Alarm</a:t>
-            </a:r>
+              <a:t>a more complete in-home security system</a:t>
+            </a:r>
+          </a:p>
+          <a:p>
+            <a:endParaRPr lang="en-US" dirty="0"/>
+          </a:p>
+        </p:txBody>
+      </p:sp>
+      <p:pic>
+        <p:nvPicPr>
+          <p:cNvPr id="4" name="Picture 3"/>
+          <p:cNvPicPr>
+            <a:picLocks noChangeAspect="1"/>
+          </p:cNvPicPr>
+          <p:nvPr/>
+        </p:nvPicPr>
+        <p:blipFill>
+          <a:blip r:embed="rId2"/>
+          <a:stretch>
+            <a:fillRect/>
+          </a:stretch>
+        </p:blipFill>
+        <p:spPr>
+          <a:xfrm>
+            <a:off x="9578721" y="1962819"/>
+            <a:ext cx="1770880" cy="2701477"/>
+          </a:xfrm>
+          <a:prstGeom prst="rect">
+            <a:avLst/>
+          </a:prstGeom>
+        </p:spPr>
+      </p:pic>
+      <p:sp>
+        <p:nvSpPr>
+          <p:cNvPr id="5" name="Rectangle 4"/>
+          <p:cNvSpPr/>
+          <p:nvPr/>
+        </p:nvSpPr>
+        <p:spPr>
+          <a:xfrm>
+            <a:off x="622691" y="6379682"/>
+            <a:ext cx="1398289" cy="343684"/>
+          </a:xfrm>
+          <a:prstGeom prst="rect">
+            <a:avLst/>
+          </a:prstGeom>
+        </p:spPr>
+        <p:txBody>
+          <a:bodyPr wrap="none">
+            <a:spAutoFit/>
+          </a:bodyPr>
+          <a:lstStyle/>
+          <a:p>
+            <a:pPr marL="457200" lvl="0" indent="-228600">
+              <a:lnSpc>
+                <a:spcPct val="120000"/>
+              </a:lnSpc>
+              <a:spcBef>
+                <a:spcPts val="600"/>
+              </a:spcBef>
+            </a:pPr>
+            <a:r>
+              <a:rPr lang="en-US" sz="1400" dirty="0" err="1">
+                <a:hlinkClick r:id="rId3" action="ppaction://hlinkfile"/>
+              </a:rPr>
+              <a:t>en.wikipedia.org</a:t>
+            </a:r>
+            <a:endParaRPr lang="en" sz="1400" u="sng" dirty="0">
+              <a:solidFill>
+                <a:schemeClr val="accent5"/>
+              </a:solidFill>
+              <a:latin typeface="Open Sans"/>
+              <a:ea typeface="Open Sans"/>
+              <a:cs typeface="Open Sans"/>
+              <a:sym typeface="Open Sans"/>
+              <a:hlinkClick r:id="rId4"/>
+            </a:endParaRPr>
           </a:p>
         </p:txBody>
       </p:sp>
     </p:spTree>
     <p:extLst>
       <p:ext uri="{BB962C8B-B14F-4D97-AF65-F5344CB8AC3E}">
-        <p14:creationId xmlns:p14="http://schemas.microsoft.com/office/powerpoint/2010/main" val="1998885270"/>
+        <p14:creationId xmlns:p14="http://schemas.microsoft.com/office/powerpoint/2010/main" val="190477035"/>
       </p:ext>
     </p:extLst>
   </p:cSld>
@@ -5285,8 +5681,12 @@
           <a:lstStyle/>
           <a:p>
             <a:r>
+              <a:rPr lang="en-US" dirty="0" err="1" smtClean="0"/>
+              <a:t>AMDeSS</a:t>
+            </a:r>
+            <a:r>
               <a:rPr lang="en-US" dirty="0" smtClean="0"/>
-              <a:t>Unexpected Issues</a:t>
+              <a:t> Implementation</a:t>
             </a:r>
             <a:endParaRPr lang="en-US" dirty="0"/>
           </a:p>
@@ -5294,87 +5694,40 @@
       </p:sp>
       <p:sp>
         <p:nvSpPr>
-          <p:cNvPr id="3" name="Content Placeholder 2"/>
-          <p:cNvSpPr>
-            <a:spLocks noGrp="1"/>
-          </p:cNvSpPr>
-          <p:nvPr>
-            <p:ph idx="1"/>
+          <p:cNvPr id="3" name="Text Placeholder 2"/>
+          <p:cNvSpPr>
+            <a:spLocks noGrp="1"/>
+          </p:cNvSpPr>
+          <p:nvPr>
+            <p:ph type="body" idx="1"/>
           </p:nvPr>
         </p:nvSpPr>
         <p:spPr/>
         <p:txBody>
-          <a:bodyPr>
-            <a:noAutofit/>
-          </a:bodyPr>
-          <a:lstStyle/>
-          <a:p>
-            <a:r>
-              <a:rPr lang="en-US" dirty="0" smtClean="0"/>
-              <a:t>Getting Over-The-Air programming to work was slower than expected</a:t>
-            </a:r>
-          </a:p>
-          <a:p>
-            <a:pPr lvl="1"/>
-            <a:r>
-              <a:rPr lang="en-US" dirty="0" smtClean="0"/>
-              <a:t>Needed a BL620 dongle for OTA to work (this was not immediately obvious)</a:t>
-            </a:r>
-          </a:p>
-          <a:p>
-            <a:pPr lvl="1"/>
-            <a:r>
-              <a:rPr lang="en-US" dirty="0" smtClean="0"/>
-              <a:t>Development kit pin configuration example confusion</a:t>
-            </a:r>
-          </a:p>
-          <a:p>
-            <a:r>
-              <a:rPr lang="en-US" dirty="0" smtClean="0"/>
-              <a:t>Unable to get the MMA8653FC accelerometer on Dr. </a:t>
-            </a:r>
-            <a:r>
-              <a:rPr lang="en-US" dirty="0" err="1" smtClean="0"/>
-              <a:t>Jovanov’s</a:t>
-            </a:r>
-            <a:r>
-              <a:rPr lang="en-US" dirty="0" smtClean="0"/>
-              <a:t> development board to work</a:t>
-            </a:r>
-          </a:p>
-          <a:p>
-            <a:pPr lvl="1"/>
-            <a:r>
-              <a:rPr lang="en-US" dirty="0" smtClean="0"/>
-              <a:t>Verified the I2C signals coming from the BL600 were correct</a:t>
-            </a:r>
-          </a:p>
-          <a:p>
-            <a:pPr lvl="1"/>
-            <a:r>
-              <a:rPr lang="en-US" dirty="0" smtClean="0"/>
-              <a:t>Verified the BL600 could communicate over I2C to the capacitance-to-digital converter</a:t>
-            </a:r>
-          </a:p>
-          <a:p>
-            <a:pPr lvl="1"/>
-            <a:r>
-              <a:rPr lang="en-US" dirty="0" smtClean="0"/>
-              <a:t>Tried 3 different development boards</a:t>
-            </a:r>
+          <a:bodyPr/>
+          <a:lstStyle/>
+          <a:p>
+            <a:endParaRPr lang="en-US"/>
           </a:p>
         </p:txBody>
       </p:sp>
     </p:spTree>
     <p:extLst>
       <p:ext uri="{BB962C8B-B14F-4D97-AF65-F5344CB8AC3E}">
-        <p14:creationId xmlns:p14="http://schemas.microsoft.com/office/powerpoint/2010/main" val="2191538965"/>
+        <p14:creationId xmlns:p14="http://schemas.microsoft.com/office/powerpoint/2010/main" val="988629239"/>
       </p:ext>
     </p:extLst>
   </p:cSld>
   <p:clrMapOvr>
     <a:masterClrMapping/>
   </p:clrMapOvr>
+  <p:timing>
+    <p:tnLst>
+      <p:par>
+        <p:cTn xmlns:p14="http://schemas.microsoft.com/office/powerpoint/2010/main" id="1" dur="indefinite" restart="never" nodeType="tmRoot"/>
+      </p:par>
+    </p:tnLst>
+  </p:timing>
 </p:sld>
 </file>
 
@@ -5412,7 +5765,7 @@
           <a:p>
             <a:r>
               <a:rPr lang="en-US" dirty="0" smtClean="0"/>
-              <a:t>Modified Project</a:t>
+              <a:t>Initial Project Approach</a:t>
             </a:r>
             <a:endParaRPr lang="en-US" dirty="0"/>
           </a:p>
@@ -5435,13 +5788,45 @@
           <a:p>
             <a:r>
               <a:rPr lang="en-US" dirty="0" smtClean="0"/>
-              <a:t>Use the capacitance-to-digital converter with a touch sensor attached to a water bottle</a:t>
+              <a:t>Android app for the user interface</a:t>
             </a:r>
           </a:p>
           <a:p>
             <a:r>
               <a:rPr lang="en-US" dirty="0" smtClean="0"/>
-              <a:t>Grasping the water bottle will be treated as the alarm condition</a:t>
+              <a:t>Use the Laird BL600 module for sensor device processing</a:t>
+            </a:r>
+          </a:p>
+          <a:p>
+            <a:r>
+              <a:rPr lang="en-US" dirty="0" smtClean="0"/>
+              <a:t>Use the MMA8653FC accelerometer for detecting movement</a:t>
+            </a:r>
+          </a:p>
+          <a:p>
+            <a:r>
+              <a:rPr lang="en-US" dirty="0" smtClean="0"/>
+              <a:t>Communication over Bluetooth Low Energy</a:t>
+            </a:r>
+          </a:p>
+          <a:p>
+            <a:r>
+              <a:rPr lang="en-US" dirty="0" smtClean="0"/>
+              <a:t>Implement a prototype on Dr. </a:t>
+            </a:r>
+            <a:r>
+              <a:rPr lang="en-US" dirty="0" err="1" smtClean="0"/>
+              <a:t>Jovanov’s</a:t>
+            </a:r>
+            <a:r>
+              <a:rPr lang="en-US" dirty="0" smtClean="0"/>
+              <a:t> development board</a:t>
+            </a:r>
+          </a:p>
+          <a:p>
+            <a:r>
+              <a:rPr lang="en-US" dirty="0" smtClean="0"/>
+              <a:t>Explore over-the-air programming of the BL600</a:t>
             </a:r>
             <a:endParaRPr lang="en-US" dirty="0"/>
           </a:p>
@@ -5450,7 +5835,7 @@
     </p:spTree>
     <p:extLst>
       <p:ext uri="{BB962C8B-B14F-4D97-AF65-F5344CB8AC3E}">
-        <p14:creationId xmlns:p14="http://schemas.microsoft.com/office/powerpoint/2010/main" val="427497236"/>
+        <p14:creationId xmlns:p14="http://schemas.microsoft.com/office/powerpoint/2010/main" val="3655513238"/>
       </p:ext>
     </p:extLst>
   </p:cSld>

</xml_diff>

<commit_message>
Adding CPE 621 to title slide
</commit_message>
<xml_diff>
--- a/docs/AMDeSS_FinalPresentation.pptx
+++ b/docs/AMDeSS_FinalPresentation.pptx
@@ -3875,7 +3875,17 @@
           <a:p>
             <a:r>
               <a:rPr lang="en-US" sz="3000" dirty="0" smtClean="0"/>
-              <a:t>Caleb Stewart &amp; John Wilkes</a:t>
+              <a:t>Caleb Stewart &amp; John </a:t>
+            </a:r>
+            <a:r>
+              <a:rPr lang="en-US" sz="3000" dirty="0" smtClean="0"/>
+              <a:t>Wilkes</a:t>
+            </a:r>
+          </a:p>
+          <a:p>
+            <a:r>
+              <a:rPr lang="en-US" sz="3000" smtClean="0"/>
+              <a:t>CPE 621</a:t>
             </a:r>
             <a:endParaRPr lang="en-US" sz="3000" dirty="0"/>
           </a:p>
@@ -4994,7 +5004,7 @@
           <a:bodyPr/>
           <a:lstStyle/>
           <a:p>
-            <a:endParaRPr lang="en-US"/>
+            <a:endParaRPr lang="en-US" dirty="0"/>
           </a:p>
         </p:txBody>
       </p:sp>
@@ -5061,7 +5071,7 @@
           <a:lstStyle/>
           <a:p>
             <a:r>
-              <a:rPr lang="en"/>
+              <a:rPr lang="en" dirty="0"/>
               <a:t>Market Research - LiveWatch</a:t>
             </a:r>
           </a:p>
@@ -5547,15 +5557,7 @@
             </a:r>
             <a:r>
               <a:rPr lang="en-US" dirty="0" smtClean="0"/>
-              <a:t>  can </a:t>
-            </a:r>
-            <a:r>
-              <a:rPr lang="en-US" smtClean="0"/>
-              <a:t>be used to complement </a:t>
-            </a:r>
-            <a:r>
-              <a:rPr lang="en-US" dirty="0" smtClean="0"/>
-              <a:t>a more complete in-home security system</a:t>
+              <a:t>  can be used to complement a more complete in-home security system</a:t>
             </a:r>
           </a:p>
           <a:p>

</xml_diff>